<commit_message>
changes some layout and add some comments on ROOT ppt
</commit_message>
<xml_diff>
--- a/document/ROOT 操作指南.pptx
+++ b/document/ROOT 操作指南.pptx
@@ -124,6 +124,134 @@
     </p:ext>
   </p:extLst>
 </p:presentation>
+</file>
+
+<file path=ppt/commentAuthors.xml><?xml version="1.0" encoding="utf-8"?>
+<p:cmAuthorLst xmlns:a="http://schemas.openxmlformats.org/drawingml/2006/main" xmlns:r="http://schemas.openxmlformats.org/officeDocument/2006/relationships" xmlns:p="http://schemas.openxmlformats.org/presentationml/2006/main">
+  <p:cmAuthor id="1" name="Yuxuan Su" initials="YS" lastIdx="9" clrIdx="0">
+    <p:extLst>
+      <p:ext uri="{19B8F6BF-5375-455C-9EA6-DF929625EA0E}">
+        <p15:presenceInfo xmlns:p15="http://schemas.microsoft.com/office/powerpoint/2012/main" userId="f56ed5dd904bc3ed" providerId="Windows Live"/>
+      </p:ext>
+    </p:extLst>
+  </p:cmAuthor>
+</p:cmAuthorLst>
+</file>
+
+<file path=ppt/comments/comment1.xml><?xml version="1.0" encoding="utf-8"?>
+<p:cmLst xmlns:a="http://schemas.openxmlformats.org/drawingml/2006/main" xmlns:r="http://schemas.openxmlformats.org/officeDocument/2006/relationships" xmlns:p="http://schemas.openxmlformats.org/presentationml/2006/main">
+  <p:cm authorId="1" dt="2019-09-19T23:11:08.972" idx="1">
+    <p:pos x="10" y="10"/>
+    <p:text>标志我缩小了一点，微调了一下位置</p:text>
+    <p:extLst>
+      <p:ext uri="{C676402C-5697-4E1C-873F-D02D1690AC5C}">
+        <p15:threadingInfo xmlns:p15="http://schemas.microsoft.com/office/powerpoint/2012/main" timeZoneBias="-480"/>
+      </p:ext>
+    </p:extLst>
+  </p:cm>
+</p:cmLst>
+</file>
+
+<file path=ppt/comments/comment2.xml><?xml version="1.0" encoding="utf-8"?>
+<p:cmLst xmlns:a="http://schemas.openxmlformats.org/drawingml/2006/main" xmlns:r="http://schemas.openxmlformats.org/officeDocument/2006/relationships" xmlns:p="http://schemas.openxmlformats.org/presentationml/2006/main">
+  <p:cm authorId="1" dt="2019-09-19T23:12:21.958" idx="2">
+    <p:pos x="3053" y="3307"/>
+    <p:text>注3： 如有任何问题，和随时与B级研究院联系</p:text>
+    <p:extLst>
+      <p:ext uri="{C676402C-5697-4E1C-873F-D02D1690AC5C}">
+        <p15:threadingInfo xmlns:p15="http://schemas.microsoft.com/office/powerpoint/2012/main" timeZoneBias="-480"/>
+      </p:ext>
+    </p:extLst>
+  </p:cm>
+</p:cmLst>
+</file>
+
+<file path=ppt/comments/comment3.xml><?xml version="1.0" encoding="utf-8"?>
+<p:cmLst xmlns:a="http://schemas.openxmlformats.org/drawingml/2006/main" xmlns:r="http://schemas.openxmlformats.org/officeDocument/2006/relationships" xmlns:p="http://schemas.openxmlformats.org/presentationml/2006/main">
+  <p:cm authorId="1" dt="2019-09-19T23:14:39.417" idx="4">
+    <p:pos x="3570" y="1184"/>
+    <p:text>这块儿要不不要在图片中花红色的消失块儿‘</p:text>
+    <p:extLst>
+      <p:ext uri="{C676402C-5697-4E1C-873F-D02D1690AC5C}">
+        <p15:threadingInfo xmlns:p15="http://schemas.microsoft.com/office/powerpoint/2012/main" timeZoneBias="-480"/>
+      </p:ext>
+    </p:extLst>
+  </p:cm>
+</p:cmLst>
+</file>
+
+<file path=ppt/comments/comment4.xml><?xml version="1.0" encoding="utf-8"?>
+<p:cmLst xmlns:a="http://schemas.openxmlformats.org/drawingml/2006/main" xmlns:r="http://schemas.openxmlformats.org/officeDocument/2006/relationships" xmlns:p="http://schemas.openxmlformats.org/presentationml/2006/main">
+  <p:cm authorId="1" dt="2019-09-19T23:17:29.293" idx="6">
+    <p:pos x="10" y="10"/>
+    <p:text>这页换到第10页之前会不会好一点？</p:text>
+    <p:extLst>
+      <p:ext uri="{C676402C-5697-4E1C-873F-D02D1690AC5C}">
+        <p15:threadingInfo xmlns:p15="http://schemas.microsoft.com/office/powerpoint/2012/main" timeZoneBias="-480"/>
+      </p:ext>
+    </p:extLst>
+  </p:cm>
+</p:cmLst>
+</file>
+
+<file path=ppt/comments/comment5.xml><?xml version="1.0" encoding="utf-8"?>
+<p:cmLst xmlns:a="http://schemas.openxmlformats.org/drawingml/2006/main" xmlns:r="http://schemas.openxmlformats.org/officeDocument/2006/relationships" xmlns:p="http://schemas.openxmlformats.org/presentationml/2006/main">
+  <p:cm authorId="1" dt="2019-09-19T23:13:46.480" idx="3">
+    <p:pos x="5853" y="1425"/>
+    <p:text>赚取改成绿色字体损失改成红色字体会不会好一点</p:text>
+    <p:extLst>
+      <p:ext uri="{C676402C-5697-4E1C-873F-D02D1690AC5C}">
+        <p15:threadingInfo xmlns:p15="http://schemas.microsoft.com/office/powerpoint/2012/main" timeZoneBias="-480"/>
+      </p:ext>
+    </p:extLst>
+  </p:cm>
+</p:cmLst>
+</file>
+
+<file path=ppt/comments/comment6.xml><?xml version="1.0" encoding="utf-8"?>
+<p:cmLst xmlns:a="http://schemas.openxmlformats.org/drawingml/2006/main" xmlns:r="http://schemas.openxmlformats.org/officeDocument/2006/relationships" xmlns:p="http://schemas.openxmlformats.org/presentationml/2006/main">
+  <p:cm authorId="1" dt="2019-09-19T23:16:07.674" idx="5">
+    <p:pos x="5048" y="3122"/>
+    <p:text>字体加上颜色会不会好一点</p:text>
+    <p:extLst>
+      <p:ext uri="{C676402C-5697-4E1C-873F-D02D1690AC5C}">
+        <p15:threadingInfo xmlns:p15="http://schemas.microsoft.com/office/powerpoint/2012/main" timeZoneBias="-480"/>
+      </p:ext>
+    </p:extLst>
+  </p:cm>
+</p:cmLst>
+</file>
+
+<file path=ppt/comments/comment7.xml><?xml version="1.0" encoding="utf-8"?>
+<p:cmLst xmlns:a="http://schemas.openxmlformats.org/drawingml/2006/main" xmlns:r="http://schemas.openxmlformats.org/officeDocument/2006/relationships" xmlns:p="http://schemas.openxmlformats.org/presentationml/2006/main">
+  <p:cm authorId="1" dt="2019-09-19T23:17:47.266" idx="7">
+    <p:pos x="10" y="10"/>
+    <p:text>若有任何需求请与A级管理人员联系</p:text>
+    <p:extLst>
+      <p:ext uri="{C676402C-5697-4E1C-873F-D02D1690AC5C}">
+        <p15:threadingInfo xmlns:p15="http://schemas.microsoft.com/office/powerpoint/2012/main" timeZoneBias="-480"/>
+      </p:ext>
+    </p:extLst>
+  </p:cm>
+  <p:cm authorId="1" dt="2019-09-19T23:18:36.276" idx="8">
+    <p:pos x="146" y="146"/>
+    <p:text>安奇钛科科技有限公司</p:text>
+    <p:extLst>
+      <p:ext uri="{C676402C-5697-4E1C-873F-D02D1690AC5C}">
+        <p15:threadingInfo xmlns:p15="http://schemas.microsoft.com/office/powerpoint/2012/main" timeZoneBias="-480"/>
+      </p:ext>
+    </p:extLst>
+  </p:cm>
+  <p:cm authorId="1" dt="2019-09-19T23:19:23.070" idx="9">
+    <p:pos x="282" y="282"/>
+    <p:text>此文档为一级文档，可按照AP-1.0协议共享，但不可随意删改，如发现违反协议，则按照AP-D协议处理</p:text>
+    <p:extLst>
+      <p:ext uri="{C676402C-5697-4E1C-873F-D02D1690AC5C}">
+        <p15:threadingInfo xmlns:p15="http://schemas.microsoft.com/office/powerpoint/2012/main" timeZoneBias="-480"/>
+      </p:ext>
+    </p:extLst>
+  </p:cm>
+</p:cmLst>
 </file>
 
 <file path=ppt/slideLayouts/slideLayout1.xml><?xml version="1.0" encoding="utf-8"?>
@@ -6091,8 +6219,8 @@
         </p:blipFill>
         <p:spPr>
           <a:xfrm>
-            <a:off x="5316485" y="1005840"/>
-            <a:ext cx="5588101" cy="5588101"/>
+            <a:off x="6096000" y="1005841"/>
+            <a:ext cx="4808586" cy="4808586"/>
           </a:xfrm>
           <a:prstGeom prst="rect">
             <a:avLst/>
@@ -6335,6 +6463,75 @@
               </a:rPr>
               <a:t>：本公司保留此操作指南的最终解释权</a:t>
             </a:r>
+            <a:endParaRPr lang="en-US" altLang="zh-CN" sz="1400" i="1" dirty="0">
+              <a:solidFill>
+                <a:schemeClr val="bg1">
+                  <a:lumMod val="65000"/>
+                </a:schemeClr>
+              </a:solidFill>
+            </a:endParaRPr>
+          </a:p>
+          <a:p>
+            <a:pPr>
+              <a:buFont typeface="Wingdings" panose="05000000000000000000" pitchFamily="2" charset="2"/>
+              <a:buChar char="§"/>
+            </a:pPr>
+            <a:r>
+              <a:rPr lang="zh-CN" altLang="en-US" sz="1400" i="1" dirty="0">
+                <a:solidFill>
+                  <a:schemeClr val="bg1">
+                    <a:lumMod val="65000"/>
+                  </a:schemeClr>
+                </a:solidFill>
+              </a:rPr>
+              <a:t>注</a:t>
+            </a:r>
+            <a:r>
+              <a:rPr lang="en-US" altLang="zh-CN" sz="1400" i="1" dirty="0">
+                <a:solidFill>
+                  <a:schemeClr val="bg1">
+                    <a:lumMod val="65000"/>
+                  </a:schemeClr>
+                </a:solidFill>
+              </a:rPr>
+              <a:t>3</a:t>
+            </a:r>
+            <a:r>
+              <a:rPr lang="zh-CN" altLang="en-US" sz="1400" i="1" dirty="0">
+                <a:solidFill>
+                  <a:schemeClr val="bg1">
+                    <a:lumMod val="65000"/>
+                  </a:schemeClr>
+                </a:solidFill>
+              </a:rPr>
+              <a:t>： 如有任何问题，和随时与</a:t>
+            </a:r>
+            <a:r>
+              <a:rPr lang="en-US" altLang="zh-CN" sz="1400" i="1" dirty="0">
+                <a:solidFill>
+                  <a:schemeClr val="bg1">
+                    <a:lumMod val="65000"/>
+                  </a:schemeClr>
+                </a:solidFill>
+              </a:rPr>
+              <a:t>B</a:t>
+            </a:r>
+            <a:r>
+              <a:rPr lang="zh-CN" altLang="en-US" sz="1400" i="1" dirty="0">
+                <a:solidFill>
+                  <a:schemeClr val="bg1">
+                    <a:lumMod val="65000"/>
+                  </a:schemeClr>
+                </a:solidFill>
+              </a:rPr>
+              <a:t>级研究院联系</a:t>
+            </a:r>
+          </a:p>
+          <a:p>
+            <a:pPr>
+              <a:buFont typeface="Wingdings" panose="05000000000000000000" pitchFamily="2" charset="2"/>
+              <a:buChar char="§"/>
+            </a:pPr>
             <a:endParaRPr lang="en-US" sz="1400" i="1" dirty="0">
               <a:solidFill>
                 <a:schemeClr val="bg1">

</xml_diff>